<commit_message>
actualización para sesión 7
</commit_message>
<xml_diff>
--- a/slides/Programación con Python01.pptx
+++ b/slides/Programación con Python01.pptx
@@ -287,7 +287,7 @@
           <a:p>
             <a:fld id="{4D2FAC17-2191-415B-AF5D-491546DAA481}" type="datetimeFigureOut">
               <a:rPr lang="es-MX" smtClean="0"/>
-              <a:t>03/04/2020</a:t>
+              <a:t>08/04/2020</a:t>
             </a:fld>
             <a:endParaRPr lang="es-MX"/>
           </a:p>
@@ -487,7 +487,7 @@
           <a:p>
             <a:fld id="{4D2FAC17-2191-415B-AF5D-491546DAA481}" type="datetimeFigureOut">
               <a:rPr lang="es-MX" smtClean="0"/>
-              <a:t>03/04/2020</a:t>
+              <a:t>08/04/2020</a:t>
             </a:fld>
             <a:endParaRPr lang="es-MX"/>
           </a:p>
@@ -697,7 +697,7 @@
           <a:p>
             <a:fld id="{4D2FAC17-2191-415B-AF5D-491546DAA481}" type="datetimeFigureOut">
               <a:rPr lang="es-MX" smtClean="0"/>
-              <a:t>03/04/2020</a:t>
+              <a:t>08/04/2020</a:t>
             </a:fld>
             <a:endParaRPr lang="es-MX"/>
           </a:p>
@@ -929,7 +929,7 @@
           <a:p>
             <a:fld id="{4D2FAC17-2191-415B-AF5D-491546DAA481}" type="datetimeFigureOut">
               <a:rPr lang="es-MX" smtClean="0"/>
-              <a:t>03/04/2020</a:t>
+              <a:t>08/04/2020</a:t>
             </a:fld>
             <a:endParaRPr lang="es-MX"/>
           </a:p>
@@ -1205,7 +1205,7 @@
           <a:p>
             <a:fld id="{4D2FAC17-2191-415B-AF5D-491546DAA481}" type="datetimeFigureOut">
               <a:rPr lang="es-MX" smtClean="0"/>
-              <a:t>03/04/2020</a:t>
+              <a:t>08/04/2020</a:t>
             </a:fld>
             <a:endParaRPr lang="es-MX"/>
           </a:p>
@@ -1473,7 +1473,7 @@
           <a:p>
             <a:fld id="{4D2FAC17-2191-415B-AF5D-491546DAA481}" type="datetimeFigureOut">
               <a:rPr lang="es-MX" smtClean="0"/>
-              <a:t>03/04/2020</a:t>
+              <a:t>08/04/2020</a:t>
             </a:fld>
             <a:endParaRPr lang="es-MX"/>
           </a:p>
@@ -1888,7 +1888,7 @@
           <a:p>
             <a:fld id="{4D2FAC17-2191-415B-AF5D-491546DAA481}" type="datetimeFigureOut">
               <a:rPr lang="es-MX" smtClean="0"/>
-              <a:t>03/04/2020</a:t>
+              <a:t>08/04/2020</a:t>
             </a:fld>
             <a:endParaRPr lang="es-MX"/>
           </a:p>
@@ -2030,7 +2030,7 @@
           <a:p>
             <a:fld id="{4D2FAC17-2191-415B-AF5D-491546DAA481}" type="datetimeFigureOut">
               <a:rPr lang="es-MX" smtClean="0"/>
-              <a:t>03/04/2020</a:t>
+              <a:t>08/04/2020</a:t>
             </a:fld>
             <a:endParaRPr lang="es-MX"/>
           </a:p>
@@ -2143,7 +2143,7 @@
           <a:p>
             <a:fld id="{4D2FAC17-2191-415B-AF5D-491546DAA481}" type="datetimeFigureOut">
               <a:rPr lang="es-MX" smtClean="0"/>
-              <a:t>03/04/2020</a:t>
+              <a:t>08/04/2020</a:t>
             </a:fld>
             <a:endParaRPr lang="es-MX"/>
           </a:p>
@@ -2456,7 +2456,7 @@
           <a:p>
             <a:fld id="{4D2FAC17-2191-415B-AF5D-491546DAA481}" type="datetimeFigureOut">
               <a:rPr lang="es-MX" smtClean="0"/>
-              <a:t>03/04/2020</a:t>
+              <a:t>08/04/2020</a:t>
             </a:fld>
             <a:endParaRPr lang="es-MX"/>
           </a:p>
@@ -2745,7 +2745,7 @@
           <a:p>
             <a:fld id="{4D2FAC17-2191-415B-AF5D-491546DAA481}" type="datetimeFigureOut">
               <a:rPr lang="es-MX" smtClean="0"/>
-              <a:t>03/04/2020</a:t>
+              <a:t>08/04/2020</a:t>
             </a:fld>
             <a:endParaRPr lang="es-MX"/>
           </a:p>
@@ -2988,7 +2988,7 @@
           <a:p>
             <a:fld id="{4D2FAC17-2191-415B-AF5D-491546DAA481}" type="datetimeFigureOut">
               <a:rPr lang="es-MX" smtClean="0"/>
-              <a:t>03/04/2020</a:t>
+              <a:t>08/04/2020</a:t>
             </a:fld>
             <a:endParaRPr lang="es-MX"/>
           </a:p>
@@ -6601,8 +6601,8 @@
         </p:nvSpPr>
         <p:spPr>
           <a:xfrm>
-            <a:off x="7552944" y="1825625"/>
-            <a:ext cx="3800856" cy="4351338"/>
+            <a:off x="7169426" y="1825625"/>
+            <a:ext cx="4184374" cy="4351338"/>
           </a:xfrm>
         </p:spPr>
         <p:txBody>
@@ -6745,6 +6745,17 @@
                 <a:hlinkClick r:id="rId4"/>
               </a:rPr>
               <a:t>https://gvanrossum.github.io/</a:t>
+            </a:r>
+            <a:endParaRPr lang="es-MX" sz="2000" dirty="0"/>
+          </a:p>
+          <a:p>
+            <a:r>
+              <a:rPr lang="es-MX" sz="2000" dirty="0"/>
+              <a:t>@</a:t>
+            </a:r>
+            <a:r>
+              <a:rPr lang="es-MX" sz="2000" dirty="0" err="1"/>
+              <a:t>gvanrossum</a:t>
             </a:r>
             <a:endParaRPr lang="es-MX" sz="2000" dirty="0"/>
           </a:p>

</xml_diff>